<commit_message>
added models to chapter 6
</commit_message>
<xml_diff>
--- a/Chapter06-IntegratingABMandGIS/Chapter6.pptx
+++ b/Chapter06-IntegratingABMandGIS/Chapter6.pptx
@@ -4,8 +4,23 @@
   <p:sldMasterIdLst>
     <p:sldMasterId id="2147483648" r:id="rId1"/>
   </p:sldMasterIdLst>
+  <p:notesMasterIdLst>
+    <p:notesMasterId r:id="rId15"/>
+  </p:notesMasterIdLst>
   <p:sldIdLst>
     <p:sldId id="256" r:id="rId2"/>
+    <p:sldId id="257" r:id="rId3"/>
+    <p:sldId id="258" r:id="rId4"/>
+    <p:sldId id="259" r:id="rId5"/>
+    <p:sldId id="260" r:id="rId6"/>
+    <p:sldId id="261" r:id="rId7"/>
+    <p:sldId id="262" r:id="rId8"/>
+    <p:sldId id="263" r:id="rId9"/>
+    <p:sldId id="264" r:id="rId10"/>
+    <p:sldId id="265" r:id="rId11"/>
+    <p:sldId id="266" r:id="rId12"/>
+    <p:sldId id="267" r:id="rId13"/>
+    <p:sldId id="268" r:id="rId14"/>
   </p:sldIdLst>
   <p:sldSz cx="12192000" cy="6858000"/>
   <p:notesSz cx="6858000" cy="9144000"/>
@@ -104,7 +119,451 @@
       </a:defRPr>
     </a:lvl9pPr>
   </p:defaultTextStyle>
+  <p:extLst>
+    <p:ext uri="{EFAFB233-063F-42B5-8137-9DF3F51BA10A}">
+      <p15:sldGuideLst xmlns:p15="http://schemas.microsoft.com/office/powerpoint/2012/main"/>
+    </p:ext>
+  </p:extLst>
 </p:presentation>
+</file>
+
+<file path=ppt/notesMasters/notesMaster1.xml><?xml version="1.0" encoding="utf-8"?>
+<p:notesMaster xmlns:a="http://schemas.openxmlformats.org/drawingml/2006/main" xmlns:r="http://schemas.openxmlformats.org/officeDocument/2006/relationships" xmlns:p="http://schemas.openxmlformats.org/presentationml/2006/main">
+  <p:cSld>
+    <p:bg>
+      <p:bgRef idx="1001">
+        <a:schemeClr val="bg1"/>
+      </p:bgRef>
+    </p:bg>
+    <p:spTree>
+      <p:nvGrpSpPr>
+        <p:cNvPr id="1" name=""/>
+        <p:cNvGrpSpPr/>
+        <p:nvPr/>
+      </p:nvGrpSpPr>
+      <p:grpSpPr>
+        <a:xfrm>
+          <a:off x="0" y="0"/>
+          <a:ext cx="0" cy="0"/>
+          <a:chOff x="0" y="0"/>
+          <a:chExt cx="0" cy="0"/>
+        </a:xfrm>
+      </p:grpSpPr>
+      <p:sp>
+        <p:nvSpPr>
+          <p:cNvPr id="2" name="Header Placeholder 1"/>
+          <p:cNvSpPr>
+            <a:spLocks noGrp="1"/>
+          </p:cNvSpPr>
+          <p:nvPr>
+            <p:ph type="hdr" sz="quarter"/>
+          </p:nvPr>
+        </p:nvSpPr>
+        <p:spPr>
+          <a:xfrm>
+            <a:off x="0" y="0"/>
+            <a:ext cx="2971800" cy="458788"/>
+          </a:xfrm>
+          <a:prstGeom prst="rect">
+            <a:avLst/>
+          </a:prstGeom>
+        </p:spPr>
+        <p:txBody>
+          <a:bodyPr vert="horz" lIns="91440" tIns="45720" rIns="91440" bIns="45720" rtlCol="0"/>
+          <a:lstStyle>
+            <a:lvl1pPr algn="l">
+              <a:defRPr sz="1200"/>
+            </a:lvl1pPr>
+          </a:lstStyle>
+          <a:p>
+            <a:endParaRPr lang="en-US"/>
+          </a:p>
+        </p:txBody>
+      </p:sp>
+      <p:sp>
+        <p:nvSpPr>
+          <p:cNvPr id="3" name="Date Placeholder 2"/>
+          <p:cNvSpPr>
+            <a:spLocks noGrp="1"/>
+          </p:cNvSpPr>
+          <p:nvPr>
+            <p:ph type="dt" idx="1"/>
+          </p:nvPr>
+        </p:nvSpPr>
+        <p:spPr>
+          <a:xfrm>
+            <a:off x="3884613" y="0"/>
+            <a:ext cx="2971800" cy="458788"/>
+          </a:xfrm>
+          <a:prstGeom prst="rect">
+            <a:avLst/>
+          </a:prstGeom>
+        </p:spPr>
+        <p:txBody>
+          <a:bodyPr vert="horz" lIns="91440" tIns="45720" rIns="91440" bIns="45720" rtlCol="0"/>
+          <a:lstStyle>
+            <a:lvl1pPr algn="r">
+              <a:defRPr sz="1200"/>
+            </a:lvl1pPr>
+          </a:lstStyle>
+          <a:p>
+            <a:fld id="{5C3B3925-1BFF-3044-BC85-C6886CAE6EDE}" type="datetimeFigureOut">
+              <a:rPr lang="en-US" smtClean="0"/>
+              <a:t>7/20/18</a:t>
+            </a:fld>
+            <a:endParaRPr lang="en-US"/>
+          </a:p>
+        </p:txBody>
+      </p:sp>
+      <p:sp>
+        <p:nvSpPr>
+          <p:cNvPr id="4" name="Slide Image Placeholder 3"/>
+          <p:cNvSpPr>
+            <a:spLocks noGrp="1" noRot="1" noChangeAspect="1"/>
+          </p:cNvSpPr>
+          <p:nvPr>
+            <p:ph type="sldImg" idx="2"/>
+          </p:nvPr>
+        </p:nvSpPr>
+        <p:spPr>
+          <a:xfrm>
+            <a:off x="685800" y="1143000"/>
+            <a:ext cx="5486400" cy="3086100"/>
+          </a:xfrm>
+          <a:prstGeom prst="rect">
+            <a:avLst/>
+          </a:prstGeom>
+          <a:noFill/>
+          <a:ln w="12700">
+            <a:solidFill>
+              <a:prstClr val="black"/>
+            </a:solidFill>
+          </a:ln>
+        </p:spPr>
+        <p:txBody>
+          <a:bodyPr vert="horz" lIns="91440" tIns="45720" rIns="91440" bIns="45720" rtlCol="0" anchor="ctr"/>
+          <a:lstStyle/>
+          <a:p>
+            <a:endParaRPr lang="en-US"/>
+          </a:p>
+        </p:txBody>
+      </p:sp>
+      <p:sp>
+        <p:nvSpPr>
+          <p:cNvPr id="5" name="Notes Placeholder 4"/>
+          <p:cNvSpPr>
+            <a:spLocks noGrp="1"/>
+          </p:cNvSpPr>
+          <p:nvPr>
+            <p:ph type="body" sz="quarter" idx="3"/>
+          </p:nvPr>
+        </p:nvSpPr>
+        <p:spPr>
+          <a:xfrm>
+            <a:off x="685800" y="4400550"/>
+            <a:ext cx="5486400" cy="3600450"/>
+          </a:xfrm>
+          <a:prstGeom prst="rect">
+            <a:avLst/>
+          </a:prstGeom>
+        </p:spPr>
+        <p:txBody>
+          <a:bodyPr vert="horz" lIns="91440" tIns="45720" rIns="91440" bIns="45720" rtlCol="0"/>
+          <a:lstStyle/>
+          <a:p>
+            <a:pPr lvl="0"/>
+            <a:r>
+              <a:rPr lang="en-US"/>
+              <a:t>Edit Master text styles</a:t>
+            </a:r>
+          </a:p>
+          <a:p>
+            <a:pPr lvl="1"/>
+            <a:r>
+              <a:rPr lang="en-US"/>
+              <a:t>Second level</a:t>
+            </a:r>
+          </a:p>
+          <a:p>
+            <a:pPr lvl="2"/>
+            <a:r>
+              <a:rPr lang="en-US"/>
+              <a:t>Third level</a:t>
+            </a:r>
+          </a:p>
+          <a:p>
+            <a:pPr lvl="3"/>
+            <a:r>
+              <a:rPr lang="en-US"/>
+              <a:t>Fourth level</a:t>
+            </a:r>
+          </a:p>
+          <a:p>
+            <a:pPr lvl="4"/>
+            <a:r>
+              <a:rPr lang="en-US"/>
+              <a:t>Fifth level</a:t>
+            </a:r>
+          </a:p>
+        </p:txBody>
+      </p:sp>
+      <p:sp>
+        <p:nvSpPr>
+          <p:cNvPr id="6" name="Footer Placeholder 5"/>
+          <p:cNvSpPr>
+            <a:spLocks noGrp="1"/>
+          </p:cNvSpPr>
+          <p:nvPr>
+            <p:ph type="ftr" sz="quarter" idx="4"/>
+          </p:nvPr>
+        </p:nvSpPr>
+        <p:spPr>
+          <a:xfrm>
+            <a:off x="0" y="8685213"/>
+            <a:ext cx="2971800" cy="458787"/>
+          </a:xfrm>
+          <a:prstGeom prst="rect">
+            <a:avLst/>
+          </a:prstGeom>
+        </p:spPr>
+        <p:txBody>
+          <a:bodyPr vert="horz" lIns="91440" tIns="45720" rIns="91440" bIns="45720" rtlCol="0" anchor="b"/>
+          <a:lstStyle>
+            <a:lvl1pPr algn="l">
+              <a:defRPr sz="1200"/>
+            </a:lvl1pPr>
+          </a:lstStyle>
+          <a:p>
+            <a:endParaRPr lang="en-US"/>
+          </a:p>
+        </p:txBody>
+      </p:sp>
+      <p:sp>
+        <p:nvSpPr>
+          <p:cNvPr id="7" name="Slide Number Placeholder 6"/>
+          <p:cNvSpPr>
+            <a:spLocks noGrp="1"/>
+          </p:cNvSpPr>
+          <p:nvPr>
+            <p:ph type="sldNum" sz="quarter" idx="5"/>
+          </p:nvPr>
+        </p:nvSpPr>
+        <p:spPr>
+          <a:xfrm>
+            <a:off x="3884613" y="8685213"/>
+            <a:ext cx="2971800" cy="458787"/>
+          </a:xfrm>
+          <a:prstGeom prst="rect">
+            <a:avLst/>
+          </a:prstGeom>
+        </p:spPr>
+        <p:txBody>
+          <a:bodyPr vert="horz" lIns="91440" tIns="45720" rIns="91440" bIns="45720" rtlCol="0" anchor="b"/>
+          <a:lstStyle>
+            <a:lvl1pPr algn="r">
+              <a:defRPr sz="1200"/>
+            </a:lvl1pPr>
+          </a:lstStyle>
+          <a:p>
+            <a:fld id="{2689396A-BC3D-F64E-AE0F-11F65C472FC4}" type="slidenum">
+              <a:rPr lang="en-US" smtClean="0"/>
+              <a:t>‹#›</a:t>
+            </a:fld>
+            <a:endParaRPr lang="en-US"/>
+          </a:p>
+        </p:txBody>
+      </p:sp>
+    </p:spTree>
+    <p:extLst>
+      <p:ext uri="{BB962C8B-B14F-4D97-AF65-F5344CB8AC3E}">
+        <p14:creationId xmlns:p14="http://schemas.microsoft.com/office/powerpoint/2010/main" val="3925485861"/>
+      </p:ext>
+    </p:extLst>
+  </p:cSld>
+  <p:clrMap bg1="lt1" tx1="dk1" bg2="lt2" tx2="dk2" accent1="accent1" accent2="accent2" accent3="accent3" accent4="accent4" accent5="accent5" accent6="accent6" hlink="hlink" folHlink="folHlink"/>
+  <p:notesStyle>
+    <a:lvl1pPr marL="0" algn="l" defTabSz="914400" rtl="0" eaLnBrk="1" latinLnBrk="0" hangingPunct="1">
+      <a:defRPr sz="1200" kern="1200">
+        <a:solidFill>
+          <a:schemeClr val="tx1"/>
+        </a:solidFill>
+        <a:latin typeface="+mn-lt"/>
+        <a:ea typeface="+mn-ea"/>
+        <a:cs typeface="+mn-cs"/>
+      </a:defRPr>
+    </a:lvl1pPr>
+    <a:lvl2pPr marL="457200" algn="l" defTabSz="914400" rtl="0" eaLnBrk="1" latinLnBrk="0" hangingPunct="1">
+      <a:defRPr sz="1200" kern="1200">
+        <a:solidFill>
+          <a:schemeClr val="tx1"/>
+        </a:solidFill>
+        <a:latin typeface="+mn-lt"/>
+        <a:ea typeface="+mn-ea"/>
+        <a:cs typeface="+mn-cs"/>
+      </a:defRPr>
+    </a:lvl2pPr>
+    <a:lvl3pPr marL="914400" algn="l" defTabSz="914400" rtl="0" eaLnBrk="1" latinLnBrk="0" hangingPunct="1">
+      <a:defRPr sz="1200" kern="1200">
+        <a:solidFill>
+          <a:schemeClr val="tx1"/>
+        </a:solidFill>
+        <a:latin typeface="+mn-lt"/>
+        <a:ea typeface="+mn-ea"/>
+        <a:cs typeface="+mn-cs"/>
+      </a:defRPr>
+    </a:lvl3pPr>
+    <a:lvl4pPr marL="1371600" algn="l" defTabSz="914400" rtl="0" eaLnBrk="1" latinLnBrk="0" hangingPunct="1">
+      <a:defRPr sz="1200" kern="1200">
+        <a:solidFill>
+          <a:schemeClr val="tx1"/>
+        </a:solidFill>
+        <a:latin typeface="+mn-lt"/>
+        <a:ea typeface="+mn-ea"/>
+        <a:cs typeface="+mn-cs"/>
+      </a:defRPr>
+    </a:lvl4pPr>
+    <a:lvl5pPr marL="1828800" algn="l" defTabSz="914400" rtl="0" eaLnBrk="1" latinLnBrk="0" hangingPunct="1">
+      <a:defRPr sz="1200" kern="1200">
+        <a:solidFill>
+          <a:schemeClr val="tx1"/>
+        </a:solidFill>
+        <a:latin typeface="+mn-lt"/>
+        <a:ea typeface="+mn-ea"/>
+        <a:cs typeface="+mn-cs"/>
+      </a:defRPr>
+    </a:lvl5pPr>
+    <a:lvl6pPr marL="2286000" algn="l" defTabSz="914400" rtl="0" eaLnBrk="1" latinLnBrk="0" hangingPunct="1">
+      <a:defRPr sz="1200" kern="1200">
+        <a:solidFill>
+          <a:schemeClr val="tx1"/>
+        </a:solidFill>
+        <a:latin typeface="+mn-lt"/>
+        <a:ea typeface="+mn-ea"/>
+        <a:cs typeface="+mn-cs"/>
+      </a:defRPr>
+    </a:lvl6pPr>
+    <a:lvl7pPr marL="2743200" algn="l" defTabSz="914400" rtl="0" eaLnBrk="1" latinLnBrk="0" hangingPunct="1">
+      <a:defRPr sz="1200" kern="1200">
+        <a:solidFill>
+          <a:schemeClr val="tx1"/>
+        </a:solidFill>
+        <a:latin typeface="+mn-lt"/>
+        <a:ea typeface="+mn-ea"/>
+        <a:cs typeface="+mn-cs"/>
+      </a:defRPr>
+    </a:lvl7pPr>
+    <a:lvl8pPr marL="3200400" algn="l" defTabSz="914400" rtl="0" eaLnBrk="1" latinLnBrk="0" hangingPunct="1">
+      <a:defRPr sz="1200" kern="1200">
+        <a:solidFill>
+          <a:schemeClr val="tx1"/>
+        </a:solidFill>
+        <a:latin typeface="+mn-lt"/>
+        <a:ea typeface="+mn-ea"/>
+        <a:cs typeface="+mn-cs"/>
+      </a:defRPr>
+    </a:lvl8pPr>
+    <a:lvl9pPr marL="3657600" algn="l" defTabSz="914400" rtl="0" eaLnBrk="1" latinLnBrk="0" hangingPunct="1">
+      <a:defRPr sz="1200" kern="1200">
+        <a:solidFill>
+          <a:schemeClr val="tx1"/>
+        </a:solidFill>
+        <a:latin typeface="+mn-lt"/>
+        <a:ea typeface="+mn-ea"/>
+        <a:cs typeface="+mn-cs"/>
+      </a:defRPr>
+    </a:lvl9pPr>
+  </p:notesStyle>
+</p:notesMaster>
+</file>
+
+<file path=ppt/notesSlides/notesSlide1.xml><?xml version="1.0" encoding="utf-8"?>
+<p:notes xmlns:a="http://schemas.openxmlformats.org/drawingml/2006/main" xmlns:r="http://schemas.openxmlformats.org/officeDocument/2006/relationships" xmlns:p="http://schemas.openxmlformats.org/presentationml/2006/main">
+  <p:cSld>
+    <p:spTree>
+      <p:nvGrpSpPr>
+        <p:cNvPr id="1" name=""/>
+        <p:cNvGrpSpPr/>
+        <p:nvPr/>
+      </p:nvGrpSpPr>
+      <p:grpSpPr>
+        <a:xfrm>
+          <a:off x="0" y="0"/>
+          <a:ext cx="0" cy="0"/>
+          <a:chOff x="0" y="0"/>
+          <a:chExt cx="0" cy="0"/>
+        </a:xfrm>
+      </p:grpSpPr>
+      <p:sp>
+        <p:nvSpPr>
+          <p:cNvPr id="2" name="Slide Image Placeholder 1"/>
+          <p:cNvSpPr>
+            <a:spLocks noGrp="1" noRot="1" noChangeAspect="1"/>
+          </p:cNvSpPr>
+          <p:nvPr>
+            <p:ph type="sldImg"/>
+          </p:nvPr>
+        </p:nvSpPr>
+        <p:spPr/>
+      </p:sp>
+      <p:sp>
+        <p:nvSpPr>
+          <p:cNvPr id="3" name="Notes Placeholder 2"/>
+          <p:cNvSpPr>
+            <a:spLocks noGrp="1"/>
+          </p:cNvSpPr>
+          <p:nvPr>
+            <p:ph type="body" idx="1"/>
+          </p:nvPr>
+        </p:nvSpPr>
+        <p:spPr/>
+        <p:txBody>
+          <a:bodyPr/>
+          <a:lstStyle/>
+          <a:p>
+            <a:r>
+              <a:rPr lang="en-US" dirty="0"/>
+              <a:t>Building on previous chapters outlining the fundamentals of GIS and agent-based modelling, what are the benefits to linking these approaches?  How is this undertaken?  This chapter will explain loose and tight coupling critiquing the relative advantages and disadvantages of both. We present an overview of open source toolkits that can be used for the creation of geographically explicit agent-based models before providing a critical look at where and how GIS and ABM should be combined offering practical advice on best practice.</a:t>
+            </a:r>
+          </a:p>
+          <a:p>
+            <a:endParaRPr lang="en-US" dirty="0"/>
+          </a:p>
+        </p:txBody>
+      </p:sp>
+      <p:sp>
+        <p:nvSpPr>
+          <p:cNvPr id="4" name="Slide Number Placeholder 3"/>
+          <p:cNvSpPr>
+            <a:spLocks noGrp="1"/>
+          </p:cNvSpPr>
+          <p:nvPr>
+            <p:ph type="sldNum" sz="quarter" idx="10"/>
+          </p:nvPr>
+        </p:nvSpPr>
+        <p:spPr/>
+        <p:txBody>
+          <a:bodyPr/>
+          <a:lstStyle/>
+          <a:p>
+            <a:fld id="{2689396A-BC3D-F64E-AE0F-11F65C472FC4}" type="slidenum">
+              <a:rPr lang="en-US" smtClean="0"/>
+              <a:t>1</a:t>
+            </a:fld>
+            <a:endParaRPr lang="en-US"/>
+          </a:p>
+        </p:txBody>
+      </p:sp>
+    </p:spTree>
+    <p:extLst>
+      <p:ext uri="{BB962C8B-B14F-4D97-AF65-F5344CB8AC3E}">
+        <p14:creationId xmlns:p14="http://schemas.microsoft.com/office/powerpoint/2010/main" val="797610327"/>
+      </p:ext>
+    </p:extLst>
+  </p:cSld>
+  <p:clrMapOvr>
+    <a:masterClrMapping/>
+  </p:clrMapOvr>
+</p:notes>
 </file>
 
 <file path=ppt/slideLayouts/slideLayout1.xml><?xml version="1.0" encoding="utf-8"?>
@@ -254,7 +713,7 @@
           <a:p>
             <a:fld id="{53326AB7-C146-8643-AC32-1D896C71A7F3}" type="datetimeFigureOut">
               <a:rPr lang="en-US" smtClean="0"/>
-              <a:t>7/16/18</a:t>
+              <a:t>7/20/18</a:t>
             </a:fld>
             <a:endParaRPr lang="en-US"/>
           </a:p>
@@ -452,7 +911,7 @@
           <a:p>
             <a:fld id="{53326AB7-C146-8643-AC32-1D896C71A7F3}" type="datetimeFigureOut">
               <a:rPr lang="en-US" smtClean="0"/>
-              <a:t>7/16/18</a:t>
+              <a:t>7/20/18</a:t>
             </a:fld>
             <a:endParaRPr lang="en-US"/>
           </a:p>
@@ -660,7 +1119,7 @@
           <a:p>
             <a:fld id="{53326AB7-C146-8643-AC32-1D896C71A7F3}" type="datetimeFigureOut">
               <a:rPr lang="en-US" smtClean="0"/>
-              <a:t>7/16/18</a:t>
+              <a:t>7/20/18</a:t>
             </a:fld>
             <a:endParaRPr lang="en-US"/>
           </a:p>
@@ -858,7 +1317,7 @@
           <a:p>
             <a:fld id="{53326AB7-C146-8643-AC32-1D896C71A7F3}" type="datetimeFigureOut">
               <a:rPr lang="en-US" smtClean="0"/>
-              <a:t>7/16/18</a:t>
+              <a:t>7/20/18</a:t>
             </a:fld>
             <a:endParaRPr lang="en-US"/>
           </a:p>
@@ -1133,7 +1592,7 @@
           <a:p>
             <a:fld id="{53326AB7-C146-8643-AC32-1D896C71A7F3}" type="datetimeFigureOut">
               <a:rPr lang="en-US" smtClean="0"/>
-              <a:t>7/16/18</a:t>
+              <a:t>7/20/18</a:t>
             </a:fld>
             <a:endParaRPr lang="en-US"/>
           </a:p>
@@ -1398,7 +1857,7 @@
           <a:p>
             <a:fld id="{53326AB7-C146-8643-AC32-1D896C71A7F3}" type="datetimeFigureOut">
               <a:rPr lang="en-US" smtClean="0"/>
-              <a:t>7/16/18</a:t>
+              <a:t>7/20/18</a:t>
             </a:fld>
             <a:endParaRPr lang="en-US"/>
           </a:p>
@@ -1810,7 +2269,7 @@
           <a:p>
             <a:fld id="{53326AB7-C146-8643-AC32-1D896C71A7F3}" type="datetimeFigureOut">
               <a:rPr lang="en-US" smtClean="0"/>
-              <a:t>7/16/18</a:t>
+              <a:t>7/20/18</a:t>
             </a:fld>
             <a:endParaRPr lang="en-US"/>
           </a:p>
@@ -1951,7 +2410,7 @@
           <a:p>
             <a:fld id="{53326AB7-C146-8643-AC32-1D896C71A7F3}" type="datetimeFigureOut">
               <a:rPr lang="en-US" smtClean="0"/>
-              <a:t>7/16/18</a:t>
+              <a:t>7/20/18</a:t>
             </a:fld>
             <a:endParaRPr lang="en-US"/>
           </a:p>
@@ -2064,7 +2523,7 @@
           <a:p>
             <a:fld id="{53326AB7-C146-8643-AC32-1D896C71A7F3}" type="datetimeFigureOut">
               <a:rPr lang="en-US" smtClean="0"/>
-              <a:t>7/16/18</a:t>
+              <a:t>7/20/18</a:t>
             </a:fld>
             <a:endParaRPr lang="en-US"/>
           </a:p>
@@ -2375,7 +2834,7 @@
           <a:p>
             <a:fld id="{53326AB7-C146-8643-AC32-1D896C71A7F3}" type="datetimeFigureOut">
               <a:rPr lang="en-US" smtClean="0"/>
-              <a:t>7/16/18</a:t>
+              <a:t>7/20/18</a:t>
             </a:fld>
             <a:endParaRPr lang="en-US"/>
           </a:p>
@@ -2663,7 +3122,7 @@
           <a:p>
             <a:fld id="{53326AB7-C146-8643-AC32-1D896C71A7F3}" type="datetimeFigureOut">
               <a:rPr lang="en-US" smtClean="0"/>
-              <a:t>7/16/18</a:t>
+              <a:t>7/20/18</a:t>
             </a:fld>
             <a:endParaRPr lang="en-US"/>
           </a:p>
@@ -2904,7 +3363,7 @@
           <a:p>
             <a:fld id="{53326AB7-C146-8643-AC32-1D896C71A7F3}" type="datetimeFigureOut">
               <a:rPr lang="en-US" smtClean="0"/>
-              <a:t>7/16/18</a:t>
+              <a:t>7/20/18</a:t>
             </a:fld>
             <a:endParaRPr lang="en-US"/>
           </a:p>
@@ -3342,7 +3801,10 @@
           <a:bodyPr/>
           <a:lstStyle/>
           <a:p>
-            <a:endParaRPr lang="en-US"/>
+            <a:r>
+              <a:rPr lang="en-US" dirty="0"/>
+              <a:t>Chapter 6</a:t>
+            </a:r>
           </a:p>
         </p:txBody>
       </p:sp>
@@ -3367,7 +3829,10 @@
           <a:bodyPr/>
           <a:lstStyle/>
           <a:p>
-            <a:endParaRPr lang="en-US"/>
+            <a:r>
+              <a:rPr lang="en-US" dirty="0"/>
+              <a:t>Integrating Agent-Based Modelling and GIS</a:t>
+            </a:r>
           </a:p>
         </p:txBody>
       </p:sp>
@@ -3375,6 +3840,1244 @@
     <p:extLst>
       <p:ext uri="{BB962C8B-B14F-4D97-AF65-F5344CB8AC3E}">
         <p14:creationId xmlns:p14="http://schemas.microsoft.com/office/powerpoint/2010/main" val="27190754"/>
+      </p:ext>
+    </p:extLst>
+  </p:cSld>
+  <p:clrMapOvr>
+    <a:masterClrMapping/>
+  </p:clrMapOvr>
+</p:sld>
+</file>
+
+<file path=ppt/slides/slide10.xml><?xml version="1.0" encoding="utf-8"?>
+<p:sld xmlns:a="http://schemas.openxmlformats.org/drawingml/2006/main" xmlns:r="http://schemas.openxmlformats.org/officeDocument/2006/relationships" xmlns:p="http://schemas.openxmlformats.org/presentationml/2006/main">
+  <p:cSld>
+    <p:spTree>
+      <p:nvGrpSpPr>
+        <p:cNvPr id="1" name=""/>
+        <p:cNvGrpSpPr/>
+        <p:nvPr/>
+      </p:nvGrpSpPr>
+      <p:grpSpPr>
+        <a:xfrm>
+          <a:off x="0" y="0"/>
+          <a:ext cx="0" cy="0"/>
+          <a:chOff x="0" y="0"/>
+          <a:chExt cx="0" cy="0"/>
+        </a:xfrm>
+      </p:grpSpPr>
+      <p:sp>
+        <p:nvSpPr>
+          <p:cNvPr id="2" name="Title 1">
+            <a:extLst>
+              <a:ext uri="{FF2B5EF4-FFF2-40B4-BE49-F238E27FC236}">
+                <a16:creationId xmlns:a16="http://schemas.microsoft.com/office/drawing/2014/main" id="{B49CB93F-97B1-D540-9363-1FA889589783}"/>
+              </a:ext>
+            </a:extLst>
+          </p:cNvPr>
+          <p:cNvSpPr>
+            <a:spLocks noGrp="1"/>
+          </p:cNvSpPr>
+          <p:nvPr>
+            <p:ph type="title"/>
+          </p:nvPr>
+        </p:nvSpPr>
+        <p:spPr/>
+        <p:txBody>
+          <a:bodyPr/>
+          <a:lstStyle/>
+          <a:p>
+            <a:r>
+              <a:rPr lang="en-US" dirty="0"/>
+              <a:t>Using Raster Data in NetLogo</a:t>
+            </a:r>
+          </a:p>
+        </p:txBody>
+      </p:sp>
+      <p:sp>
+        <p:nvSpPr>
+          <p:cNvPr id="3" name="Content Placeholder 2">
+            <a:extLst>
+              <a:ext uri="{FF2B5EF4-FFF2-40B4-BE49-F238E27FC236}">
+                <a16:creationId xmlns:a16="http://schemas.microsoft.com/office/drawing/2014/main" id="{34C95E30-8308-5042-B7A9-B81D432E8357}"/>
+              </a:ext>
+            </a:extLst>
+          </p:cNvPr>
+          <p:cNvSpPr>
+            <a:spLocks noGrp="1"/>
+          </p:cNvSpPr>
+          <p:nvPr>
+            <p:ph idx="1"/>
+          </p:nvPr>
+        </p:nvSpPr>
+        <p:spPr/>
+        <p:txBody>
+          <a:bodyPr/>
+          <a:lstStyle/>
+          <a:p>
+            <a:endParaRPr lang="en-US"/>
+          </a:p>
+        </p:txBody>
+      </p:sp>
+    </p:spTree>
+    <p:extLst>
+      <p:ext uri="{BB962C8B-B14F-4D97-AF65-F5344CB8AC3E}">
+        <p14:creationId xmlns:p14="http://schemas.microsoft.com/office/powerpoint/2010/main" val="296934505"/>
+      </p:ext>
+    </p:extLst>
+  </p:cSld>
+  <p:clrMapOvr>
+    <a:masterClrMapping/>
+  </p:clrMapOvr>
+</p:sld>
+</file>
+
+<file path=ppt/slides/slide11.xml><?xml version="1.0" encoding="utf-8"?>
+<p:sld xmlns:a="http://schemas.openxmlformats.org/drawingml/2006/main" xmlns:r="http://schemas.openxmlformats.org/officeDocument/2006/relationships" xmlns:p="http://schemas.openxmlformats.org/presentationml/2006/main">
+  <p:cSld>
+    <p:spTree>
+      <p:nvGrpSpPr>
+        <p:cNvPr id="1" name=""/>
+        <p:cNvGrpSpPr/>
+        <p:nvPr/>
+      </p:nvGrpSpPr>
+      <p:grpSpPr>
+        <a:xfrm>
+          <a:off x="0" y="0"/>
+          <a:ext cx="0" cy="0"/>
+          <a:chOff x="0" y="0"/>
+          <a:chExt cx="0" cy="0"/>
+        </a:xfrm>
+      </p:grpSpPr>
+      <p:sp>
+        <p:nvSpPr>
+          <p:cNvPr id="2" name="Title 1">
+            <a:extLst>
+              <a:ext uri="{FF2B5EF4-FFF2-40B4-BE49-F238E27FC236}">
+                <a16:creationId xmlns:a16="http://schemas.microsoft.com/office/drawing/2014/main" id="{3FDA69EA-3F5F-2E4C-B54F-540D572A9E7C}"/>
+              </a:ext>
+            </a:extLst>
+          </p:cNvPr>
+          <p:cNvSpPr>
+            <a:spLocks noGrp="1"/>
+          </p:cNvSpPr>
+          <p:nvPr>
+            <p:ph type="title"/>
+          </p:nvPr>
+        </p:nvSpPr>
+        <p:spPr/>
+        <p:txBody>
+          <a:bodyPr/>
+          <a:lstStyle/>
+          <a:p>
+            <a:r>
+              <a:rPr lang="en-US" dirty="0"/>
+              <a:t>Raster Model Examples: Urban Growth and Pedestrian Modelling</a:t>
+            </a:r>
+          </a:p>
+        </p:txBody>
+      </p:sp>
+      <p:sp>
+        <p:nvSpPr>
+          <p:cNvPr id="3" name="Content Placeholder 2">
+            <a:extLst>
+              <a:ext uri="{FF2B5EF4-FFF2-40B4-BE49-F238E27FC236}">
+                <a16:creationId xmlns:a16="http://schemas.microsoft.com/office/drawing/2014/main" id="{56AF6529-4739-304E-AADF-75AA0BE656F4}"/>
+              </a:ext>
+            </a:extLst>
+          </p:cNvPr>
+          <p:cNvSpPr>
+            <a:spLocks noGrp="1"/>
+          </p:cNvSpPr>
+          <p:nvPr>
+            <p:ph idx="1"/>
+          </p:nvPr>
+        </p:nvSpPr>
+        <p:spPr/>
+        <p:txBody>
+          <a:bodyPr/>
+          <a:lstStyle/>
+          <a:p>
+            <a:endParaRPr lang="en-US"/>
+          </a:p>
+        </p:txBody>
+      </p:sp>
+    </p:spTree>
+    <p:extLst>
+      <p:ext uri="{BB962C8B-B14F-4D97-AF65-F5344CB8AC3E}">
+        <p14:creationId xmlns:p14="http://schemas.microsoft.com/office/powerpoint/2010/main" val="1490484717"/>
+      </p:ext>
+    </p:extLst>
+  </p:cSld>
+  <p:clrMapOvr>
+    <a:masterClrMapping/>
+  </p:clrMapOvr>
+</p:sld>
+</file>
+
+<file path=ppt/slides/slide12.xml><?xml version="1.0" encoding="utf-8"?>
+<p:sld xmlns:a="http://schemas.openxmlformats.org/drawingml/2006/main" xmlns:r="http://schemas.openxmlformats.org/officeDocument/2006/relationships" xmlns:p="http://schemas.openxmlformats.org/presentationml/2006/main">
+  <p:cSld>
+    <p:spTree>
+      <p:nvGrpSpPr>
+        <p:cNvPr id="1" name=""/>
+        <p:cNvGrpSpPr/>
+        <p:nvPr/>
+      </p:nvGrpSpPr>
+      <p:grpSpPr>
+        <a:xfrm>
+          <a:off x="0" y="0"/>
+          <a:ext cx="0" cy="0"/>
+          <a:chOff x="0" y="0"/>
+          <a:chExt cx="0" cy="0"/>
+        </a:xfrm>
+      </p:grpSpPr>
+      <p:sp>
+        <p:nvSpPr>
+          <p:cNvPr id="2" name="Title 1">
+            <a:extLst>
+              <a:ext uri="{FF2B5EF4-FFF2-40B4-BE49-F238E27FC236}">
+                <a16:creationId xmlns:a16="http://schemas.microsoft.com/office/drawing/2014/main" id="{84D7EFA7-EA7B-4448-8F40-97CB4850005C}"/>
+              </a:ext>
+            </a:extLst>
+          </p:cNvPr>
+          <p:cNvSpPr>
+            <a:spLocks noGrp="1"/>
+          </p:cNvSpPr>
+          <p:nvPr>
+            <p:ph type="title"/>
+          </p:nvPr>
+        </p:nvSpPr>
+        <p:spPr/>
+        <p:txBody>
+          <a:bodyPr/>
+          <a:lstStyle/>
+          <a:p>
+            <a:r>
+              <a:rPr lang="en-US" dirty="0"/>
+              <a:t>Urban Growth</a:t>
+            </a:r>
+          </a:p>
+        </p:txBody>
+      </p:sp>
+      <p:sp>
+        <p:nvSpPr>
+          <p:cNvPr id="3" name="Content Placeholder 2">
+            <a:extLst>
+              <a:ext uri="{FF2B5EF4-FFF2-40B4-BE49-F238E27FC236}">
+                <a16:creationId xmlns:a16="http://schemas.microsoft.com/office/drawing/2014/main" id="{670EBA64-40E4-EA48-B598-4459AF5ECDE2}"/>
+              </a:ext>
+            </a:extLst>
+          </p:cNvPr>
+          <p:cNvSpPr>
+            <a:spLocks noGrp="1"/>
+          </p:cNvSpPr>
+          <p:nvPr>
+            <p:ph idx="1"/>
+          </p:nvPr>
+        </p:nvSpPr>
+        <p:spPr/>
+        <p:txBody>
+          <a:bodyPr/>
+          <a:lstStyle/>
+          <a:p>
+            <a:endParaRPr lang="en-US"/>
+          </a:p>
+        </p:txBody>
+      </p:sp>
+    </p:spTree>
+    <p:extLst>
+      <p:ext uri="{BB962C8B-B14F-4D97-AF65-F5344CB8AC3E}">
+        <p14:creationId xmlns:p14="http://schemas.microsoft.com/office/powerpoint/2010/main" val="2377690622"/>
+      </p:ext>
+    </p:extLst>
+  </p:cSld>
+  <p:clrMapOvr>
+    <a:masterClrMapping/>
+  </p:clrMapOvr>
+</p:sld>
+</file>
+
+<file path=ppt/slides/slide13.xml><?xml version="1.0" encoding="utf-8"?>
+<p:sld xmlns:a="http://schemas.openxmlformats.org/drawingml/2006/main" xmlns:r="http://schemas.openxmlformats.org/officeDocument/2006/relationships" xmlns:p="http://schemas.openxmlformats.org/presentationml/2006/main">
+  <p:cSld>
+    <p:spTree>
+      <p:nvGrpSpPr>
+        <p:cNvPr id="1" name=""/>
+        <p:cNvGrpSpPr/>
+        <p:nvPr/>
+      </p:nvGrpSpPr>
+      <p:grpSpPr>
+        <a:xfrm>
+          <a:off x="0" y="0"/>
+          <a:ext cx="0" cy="0"/>
+          <a:chOff x="0" y="0"/>
+          <a:chExt cx="0" cy="0"/>
+        </a:xfrm>
+      </p:grpSpPr>
+      <p:sp>
+        <p:nvSpPr>
+          <p:cNvPr id="2" name="Title 1">
+            <a:extLst>
+              <a:ext uri="{FF2B5EF4-FFF2-40B4-BE49-F238E27FC236}">
+                <a16:creationId xmlns:a16="http://schemas.microsoft.com/office/drawing/2014/main" id="{DEB5913C-2BD8-F54B-8054-573F24847D98}"/>
+              </a:ext>
+            </a:extLst>
+          </p:cNvPr>
+          <p:cNvSpPr>
+            <a:spLocks noGrp="1"/>
+          </p:cNvSpPr>
+          <p:nvPr>
+            <p:ph type="title"/>
+          </p:nvPr>
+        </p:nvSpPr>
+        <p:spPr/>
+        <p:txBody>
+          <a:bodyPr/>
+          <a:lstStyle/>
+          <a:p>
+            <a:r>
+              <a:rPr lang="en-US" dirty="0"/>
+              <a:t>Pedestrian Modelling</a:t>
+            </a:r>
+          </a:p>
+        </p:txBody>
+      </p:sp>
+      <p:sp>
+        <p:nvSpPr>
+          <p:cNvPr id="3" name="Content Placeholder 2">
+            <a:extLst>
+              <a:ext uri="{FF2B5EF4-FFF2-40B4-BE49-F238E27FC236}">
+                <a16:creationId xmlns:a16="http://schemas.microsoft.com/office/drawing/2014/main" id="{D339DBC4-1C61-D140-99E8-63679848BE0C}"/>
+              </a:ext>
+            </a:extLst>
+          </p:cNvPr>
+          <p:cNvSpPr>
+            <a:spLocks noGrp="1"/>
+          </p:cNvSpPr>
+          <p:nvPr>
+            <p:ph idx="1"/>
+          </p:nvPr>
+        </p:nvSpPr>
+        <p:spPr/>
+        <p:txBody>
+          <a:bodyPr/>
+          <a:lstStyle/>
+          <a:p>
+            <a:endParaRPr lang="en-US"/>
+          </a:p>
+        </p:txBody>
+      </p:sp>
+    </p:spTree>
+    <p:extLst>
+      <p:ext uri="{BB962C8B-B14F-4D97-AF65-F5344CB8AC3E}">
+        <p14:creationId xmlns:p14="http://schemas.microsoft.com/office/powerpoint/2010/main" val="1242729681"/>
+      </p:ext>
+    </p:extLst>
+  </p:cSld>
+  <p:clrMapOvr>
+    <a:masterClrMapping/>
+  </p:clrMapOvr>
+</p:sld>
+</file>
+
+<file path=ppt/slides/slide2.xml><?xml version="1.0" encoding="utf-8"?>
+<p:sld xmlns:a="http://schemas.openxmlformats.org/drawingml/2006/main" xmlns:r="http://schemas.openxmlformats.org/officeDocument/2006/relationships" xmlns:p="http://schemas.openxmlformats.org/presentationml/2006/main">
+  <p:cSld>
+    <p:spTree>
+      <p:nvGrpSpPr>
+        <p:cNvPr id="1" name=""/>
+        <p:cNvGrpSpPr/>
+        <p:nvPr/>
+      </p:nvGrpSpPr>
+      <p:grpSpPr>
+        <a:xfrm>
+          <a:off x="0" y="0"/>
+          <a:ext cx="0" cy="0"/>
+          <a:chOff x="0" y="0"/>
+          <a:chExt cx="0" cy="0"/>
+        </a:xfrm>
+      </p:grpSpPr>
+      <p:sp>
+        <p:nvSpPr>
+          <p:cNvPr id="2" name="Title 1">
+            <a:extLst>
+              <a:ext uri="{FF2B5EF4-FFF2-40B4-BE49-F238E27FC236}">
+                <a16:creationId xmlns:a16="http://schemas.microsoft.com/office/drawing/2014/main" id="{866515DB-4BC7-2B4A-A921-345A89E90728}"/>
+              </a:ext>
+            </a:extLst>
+          </p:cNvPr>
+          <p:cNvSpPr>
+            <a:spLocks noGrp="1"/>
+          </p:cNvSpPr>
+          <p:nvPr>
+            <p:ph type="title"/>
+          </p:nvPr>
+        </p:nvSpPr>
+        <p:spPr/>
+        <p:txBody>
+          <a:bodyPr/>
+          <a:lstStyle/>
+          <a:p>
+            <a:r>
+              <a:rPr lang="en-US" dirty="0"/>
+              <a:t>Creating an ‘</a:t>
+            </a:r>
+            <a:r>
+              <a:rPr lang="en-US" i="1" dirty="0"/>
+              <a:t>Artificial World</a:t>
+            </a:r>
+            <a:r>
+              <a:rPr lang="en-US" dirty="0"/>
+              <a:t>’ from GIS Data</a:t>
+            </a:r>
+          </a:p>
+        </p:txBody>
+      </p:sp>
+      <p:pic>
+        <p:nvPicPr>
+          <p:cNvPr id="6" name="Content Placeholder 5">
+            <a:extLst>
+              <a:ext uri="{FF2B5EF4-FFF2-40B4-BE49-F238E27FC236}">
+                <a16:creationId xmlns:a16="http://schemas.microsoft.com/office/drawing/2014/main" id="{80AB41D2-8C66-A547-A2B4-63444526BF91}"/>
+              </a:ext>
+            </a:extLst>
+          </p:cNvPr>
+          <p:cNvPicPr>
+            <a:picLocks noGrp="1" noChangeAspect="1"/>
+          </p:cNvPicPr>
+          <p:nvPr>
+            <p:ph idx="1"/>
+          </p:nvPr>
+        </p:nvPicPr>
+        <p:blipFill>
+          <a:blip r:embed="rId2"/>
+          <a:stretch>
+            <a:fillRect/>
+          </a:stretch>
+        </p:blipFill>
+        <p:spPr>
+          <a:xfrm>
+            <a:off x="3458294" y="1825625"/>
+            <a:ext cx="5275412" cy="4351338"/>
+          </a:xfrm>
+        </p:spPr>
+      </p:pic>
+      <p:sp>
+        <p:nvSpPr>
+          <p:cNvPr id="4" name="TextBox 3">
+            <a:extLst>
+              <a:ext uri="{FF2B5EF4-FFF2-40B4-BE49-F238E27FC236}">
+                <a16:creationId xmlns:a16="http://schemas.microsoft.com/office/drawing/2014/main" id="{1B2072CA-A5BE-6F48-99A3-63129004DC56}"/>
+              </a:ext>
+            </a:extLst>
+          </p:cNvPr>
+          <p:cNvSpPr txBox="1"/>
+          <p:nvPr/>
+        </p:nvSpPr>
+        <p:spPr>
+          <a:xfrm>
+            <a:off x="515133" y="6176963"/>
+            <a:ext cx="11161734" cy="646331"/>
+          </a:xfrm>
+          <a:prstGeom prst="rect">
+            <a:avLst/>
+          </a:prstGeom>
+          <a:noFill/>
+        </p:spPr>
+        <p:txBody>
+          <a:bodyPr wrap="square" rtlCol="0">
+            <a:spAutoFit/>
+          </a:bodyPr>
+          <a:lstStyle/>
+          <a:p>
+            <a:r>
+              <a:rPr lang="en-US" dirty="0"/>
+              <a:t>Figure 6.1: Abstracting from the “real” world into a series of layers to be used in the artificial world for which to base the agent-based model upon. </a:t>
+            </a:r>
+          </a:p>
+        </p:txBody>
+      </p:sp>
+    </p:spTree>
+    <p:extLst>
+      <p:ext uri="{BB962C8B-B14F-4D97-AF65-F5344CB8AC3E}">
+        <p14:creationId xmlns:p14="http://schemas.microsoft.com/office/powerpoint/2010/main" val="1416649146"/>
+      </p:ext>
+    </p:extLst>
+  </p:cSld>
+  <p:clrMapOvr>
+    <a:masterClrMapping/>
+  </p:clrMapOvr>
+</p:sld>
+</file>
+
+<file path=ppt/slides/slide3.xml><?xml version="1.0" encoding="utf-8"?>
+<p:sld xmlns:a="http://schemas.openxmlformats.org/drawingml/2006/main" xmlns:r="http://schemas.openxmlformats.org/officeDocument/2006/relationships" xmlns:p="http://schemas.openxmlformats.org/presentationml/2006/main">
+  <p:cSld>
+    <p:spTree>
+      <p:nvGrpSpPr>
+        <p:cNvPr id="1" name=""/>
+        <p:cNvGrpSpPr/>
+        <p:nvPr/>
+      </p:nvGrpSpPr>
+      <p:grpSpPr>
+        <a:xfrm>
+          <a:off x="0" y="0"/>
+          <a:ext cx="0" cy="0"/>
+          <a:chOff x="0" y="0"/>
+          <a:chExt cx="0" cy="0"/>
+        </a:xfrm>
+      </p:grpSpPr>
+      <p:sp>
+        <p:nvSpPr>
+          <p:cNvPr id="2" name="Title 1">
+            <a:extLst>
+              <a:ext uri="{FF2B5EF4-FFF2-40B4-BE49-F238E27FC236}">
+                <a16:creationId xmlns:a16="http://schemas.microsoft.com/office/drawing/2014/main" id="{96FC2E83-EE43-B743-92D9-D9F84FFFE2C2}"/>
+              </a:ext>
+            </a:extLst>
+          </p:cNvPr>
+          <p:cNvSpPr>
+            <a:spLocks noGrp="1"/>
+          </p:cNvSpPr>
+          <p:nvPr>
+            <p:ph type="title"/>
+          </p:nvPr>
+        </p:nvSpPr>
+        <p:spPr/>
+        <p:txBody>
+          <a:bodyPr/>
+          <a:lstStyle/>
+          <a:p>
+            <a:r>
+              <a:rPr lang="en-US" dirty="0"/>
+              <a:t>Coupling and Embedding GIS and Agent-based Models</a:t>
+            </a:r>
+          </a:p>
+        </p:txBody>
+      </p:sp>
+      <p:pic>
+        <p:nvPicPr>
+          <p:cNvPr id="5" name="Content Placeholder 4">
+            <a:extLst>
+              <a:ext uri="{FF2B5EF4-FFF2-40B4-BE49-F238E27FC236}">
+                <a16:creationId xmlns:a16="http://schemas.microsoft.com/office/drawing/2014/main" id="{68A0CB88-90C7-9C4A-AA97-BB6415D1C189}"/>
+              </a:ext>
+            </a:extLst>
+          </p:cNvPr>
+          <p:cNvPicPr>
+            <a:picLocks noGrp="1" noChangeAspect="1"/>
+          </p:cNvPicPr>
+          <p:nvPr>
+            <p:ph idx="1"/>
+          </p:nvPr>
+        </p:nvPicPr>
+        <p:blipFill>
+          <a:blip r:embed="rId2"/>
+          <a:stretch>
+            <a:fillRect/>
+          </a:stretch>
+        </p:blipFill>
+        <p:spPr>
+          <a:xfrm>
+            <a:off x="977275" y="1690688"/>
+            <a:ext cx="10237450" cy="4897546"/>
+          </a:xfrm>
+        </p:spPr>
+      </p:pic>
+    </p:spTree>
+    <p:extLst>
+      <p:ext uri="{BB962C8B-B14F-4D97-AF65-F5344CB8AC3E}">
+        <p14:creationId xmlns:p14="http://schemas.microsoft.com/office/powerpoint/2010/main" val="1255607833"/>
+      </p:ext>
+    </p:extLst>
+  </p:cSld>
+  <p:clrMapOvr>
+    <a:masterClrMapping/>
+  </p:clrMapOvr>
+</p:sld>
+</file>
+
+<file path=ppt/slides/slide4.xml><?xml version="1.0" encoding="utf-8"?>
+<p:sld xmlns:a="http://schemas.openxmlformats.org/drawingml/2006/main" xmlns:r="http://schemas.openxmlformats.org/officeDocument/2006/relationships" xmlns:p="http://schemas.openxmlformats.org/presentationml/2006/main">
+  <p:cSld>
+    <p:spTree>
+      <p:nvGrpSpPr>
+        <p:cNvPr id="1" name=""/>
+        <p:cNvGrpSpPr/>
+        <p:nvPr/>
+      </p:nvGrpSpPr>
+      <p:grpSpPr>
+        <a:xfrm>
+          <a:off x="0" y="0"/>
+          <a:ext cx="0" cy="0"/>
+          <a:chOff x="0" y="0"/>
+          <a:chExt cx="0" cy="0"/>
+        </a:xfrm>
+      </p:grpSpPr>
+      <p:sp>
+        <p:nvSpPr>
+          <p:cNvPr id="2" name="Title 1">
+            <a:extLst>
+              <a:ext uri="{FF2B5EF4-FFF2-40B4-BE49-F238E27FC236}">
+                <a16:creationId xmlns:a16="http://schemas.microsoft.com/office/drawing/2014/main" id="{4B1B7061-3743-2D48-8966-510956962EA8}"/>
+              </a:ext>
+            </a:extLst>
+          </p:cNvPr>
+          <p:cNvSpPr>
+            <a:spLocks noGrp="1"/>
+          </p:cNvSpPr>
+          <p:nvPr>
+            <p:ph type="title"/>
+          </p:nvPr>
+        </p:nvSpPr>
+        <p:spPr>
+          <a:xfrm>
+            <a:off x="448733" y="382059"/>
+            <a:ext cx="6968290" cy="1599142"/>
+          </a:xfrm>
+        </p:spPr>
+        <p:txBody>
+          <a:bodyPr>
+            <a:normAutofit fontScale="90000"/>
+          </a:bodyPr>
+          <a:lstStyle/>
+          <a:p>
+            <a:r>
+              <a:rPr lang="en-US" dirty="0"/>
+              <a:t>Tools for Constructing and Developing Agent-based Models</a:t>
+            </a:r>
+          </a:p>
+        </p:txBody>
+      </p:sp>
+      <p:pic>
+        <p:nvPicPr>
+          <p:cNvPr id="5" name="Content Placeholder 4">
+            <a:extLst>
+              <a:ext uri="{FF2B5EF4-FFF2-40B4-BE49-F238E27FC236}">
+                <a16:creationId xmlns:a16="http://schemas.microsoft.com/office/drawing/2014/main" id="{334DBC1F-C207-B14F-8473-719CFD70C1EF}"/>
+              </a:ext>
+            </a:extLst>
+          </p:cNvPr>
+          <p:cNvPicPr>
+            <a:picLocks noGrp="1" noChangeAspect="1"/>
+          </p:cNvPicPr>
+          <p:nvPr>
+            <p:ph idx="1"/>
+          </p:nvPr>
+        </p:nvPicPr>
+        <p:blipFill>
+          <a:blip r:embed="rId2"/>
+          <a:stretch>
+            <a:fillRect/>
+          </a:stretch>
+        </p:blipFill>
+        <p:spPr>
+          <a:xfrm>
+            <a:off x="7806490" y="1"/>
+            <a:ext cx="4385510" cy="6858000"/>
+          </a:xfrm>
+        </p:spPr>
+      </p:pic>
+    </p:spTree>
+    <p:extLst>
+      <p:ext uri="{BB962C8B-B14F-4D97-AF65-F5344CB8AC3E}">
+        <p14:creationId xmlns:p14="http://schemas.microsoft.com/office/powerpoint/2010/main" val="3480336566"/>
+      </p:ext>
+    </p:extLst>
+  </p:cSld>
+  <p:clrMapOvr>
+    <a:masterClrMapping/>
+  </p:clrMapOvr>
+</p:sld>
+</file>
+
+<file path=ppt/slides/slide5.xml><?xml version="1.0" encoding="utf-8"?>
+<p:sld xmlns:a="http://schemas.openxmlformats.org/drawingml/2006/main" xmlns:r="http://schemas.openxmlformats.org/officeDocument/2006/relationships" xmlns:p="http://schemas.openxmlformats.org/presentationml/2006/main">
+  <p:cSld>
+    <p:spTree>
+      <p:nvGrpSpPr>
+        <p:cNvPr id="1" name=""/>
+        <p:cNvGrpSpPr/>
+        <p:nvPr/>
+      </p:nvGrpSpPr>
+      <p:grpSpPr>
+        <a:xfrm>
+          <a:off x="0" y="0"/>
+          <a:ext cx="0" cy="0"/>
+          <a:chOff x="0" y="0"/>
+          <a:chExt cx="0" cy="0"/>
+        </a:xfrm>
+      </p:grpSpPr>
+      <p:sp>
+        <p:nvSpPr>
+          <p:cNvPr id="2" name="Title 1">
+            <a:extLst>
+              <a:ext uri="{FF2B5EF4-FFF2-40B4-BE49-F238E27FC236}">
+                <a16:creationId xmlns:a16="http://schemas.microsoft.com/office/drawing/2014/main" id="{ACDF2435-7248-3B48-8BDF-53E90D03DFA7}"/>
+              </a:ext>
+            </a:extLst>
+          </p:cNvPr>
+          <p:cNvSpPr>
+            <a:spLocks noGrp="1"/>
+          </p:cNvSpPr>
+          <p:nvPr>
+            <p:ph type="title"/>
+          </p:nvPr>
+        </p:nvSpPr>
+        <p:spPr/>
+        <p:txBody>
+          <a:bodyPr/>
+          <a:lstStyle/>
+          <a:p>
+            <a:r>
+              <a:rPr lang="en-US" dirty="0"/>
+              <a:t>Swarm</a:t>
+            </a:r>
+          </a:p>
+        </p:txBody>
+      </p:sp>
+      <p:sp>
+        <p:nvSpPr>
+          <p:cNvPr id="3" name="Content Placeholder 2">
+            <a:extLst>
+              <a:ext uri="{FF2B5EF4-FFF2-40B4-BE49-F238E27FC236}">
+                <a16:creationId xmlns:a16="http://schemas.microsoft.com/office/drawing/2014/main" id="{E49630C9-C326-6A4A-8629-8835AC897C65}"/>
+              </a:ext>
+            </a:extLst>
+          </p:cNvPr>
+          <p:cNvSpPr>
+            <a:spLocks noGrp="1"/>
+          </p:cNvSpPr>
+          <p:nvPr>
+            <p:ph idx="1"/>
+          </p:nvPr>
+        </p:nvSpPr>
+        <p:spPr/>
+        <p:txBody>
+          <a:bodyPr/>
+          <a:lstStyle/>
+          <a:p>
+            <a:endParaRPr lang="en-US"/>
+          </a:p>
+        </p:txBody>
+      </p:sp>
+    </p:spTree>
+    <p:extLst>
+      <p:ext uri="{BB962C8B-B14F-4D97-AF65-F5344CB8AC3E}">
+        <p14:creationId xmlns:p14="http://schemas.microsoft.com/office/powerpoint/2010/main" val="3026064434"/>
+      </p:ext>
+    </p:extLst>
+  </p:cSld>
+  <p:clrMapOvr>
+    <a:masterClrMapping/>
+  </p:clrMapOvr>
+</p:sld>
+</file>
+
+<file path=ppt/slides/slide6.xml><?xml version="1.0" encoding="utf-8"?>
+<p:sld xmlns:a="http://schemas.openxmlformats.org/drawingml/2006/main" xmlns:r="http://schemas.openxmlformats.org/officeDocument/2006/relationships" xmlns:p="http://schemas.openxmlformats.org/presentationml/2006/main">
+  <p:cSld>
+    <p:spTree>
+      <p:nvGrpSpPr>
+        <p:cNvPr id="1" name=""/>
+        <p:cNvGrpSpPr/>
+        <p:nvPr/>
+      </p:nvGrpSpPr>
+      <p:grpSpPr>
+        <a:xfrm>
+          <a:off x="0" y="0"/>
+          <a:ext cx="0" cy="0"/>
+          <a:chOff x="0" y="0"/>
+          <a:chExt cx="0" cy="0"/>
+        </a:xfrm>
+      </p:grpSpPr>
+      <p:sp>
+        <p:nvSpPr>
+          <p:cNvPr id="2" name="Title 1">
+            <a:extLst>
+              <a:ext uri="{FF2B5EF4-FFF2-40B4-BE49-F238E27FC236}">
+                <a16:creationId xmlns:a16="http://schemas.microsoft.com/office/drawing/2014/main" id="{7DF62CD1-B271-0D4A-859A-05BC09EDA1D2}"/>
+              </a:ext>
+            </a:extLst>
+          </p:cNvPr>
+          <p:cNvSpPr>
+            <a:spLocks noGrp="1"/>
+          </p:cNvSpPr>
+          <p:nvPr>
+            <p:ph type="title"/>
+          </p:nvPr>
+        </p:nvSpPr>
+        <p:spPr/>
+        <p:txBody>
+          <a:bodyPr/>
+          <a:lstStyle/>
+          <a:p>
+            <a:r>
+              <a:rPr lang="en-US" dirty="0"/>
+              <a:t>MASON</a:t>
+            </a:r>
+          </a:p>
+        </p:txBody>
+      </p:sp>
+      <p:pic>
+        <p:nvPicPr>
+          <p:cNvPr id="5" name="Content Placeholder 4">
+            <a:extLst>
+              <a:ext uri="{FF2B5EF4-FFF2-40B4-BE49-F238E27FC236}">
+                <a16:creationId xmlns:a16="http://schemas.microsoft.com/office/drawing/2014/main" id="{AE44102A-1CEF-B045-AAE2-E75FF04B5C79}"/>
+              </a:ext>
+            </a:extLst>
+          </p:cNvPr>
+          <p:cNvPicPr>
+            <a:picLocks noGrp="1" noChangeAspect="1"/>
+          </p:cNvPicPr>
+          <p:nvPr>
+            <p:ph idx="1"/>
+          </p:nvPr>
+        </p:nvPicPr>
+        <p:blipFill>
+          <a:blip r:embed="rId2"/>
+          <a:stretch>
+            <a:fillRect/>
+          </a:stretch>
+        </p:blipFill>
+        <p:spPr>
+          <a:xfrm>
+            <a:off x="6253195" y="365125"/>
+            <a:ext cx="4664008" cy="4351338"/>
+          </a:xfrm>
+        </p:spPr>
+      </p:pic>
+      <p:sp>
+        <p:nvSpPr>
+          <p:cNvPr id="6" name="TextBox 5">
+            <a:extLst>
+              <a:ext uri="{FF2B5EF4-FFF2-40B4-BE49-F238E27FC236}">
+                <a16:creationId xmlns:a16="http://schemas.microsoft.com/office/drawing/2014/main" id="{85C2092D-C391-214F-987C-5BD49D93DEA8}"/>
+              </a:ext>
+            </a:extLst>
+          </p:cNvPr>
+          <p:cNvSpPr txBox="1"/>
+          <p:nvPr/>
+        </p:nvSpPr>
+        <p:spPr>
+          <a:xfrm>
+            <a:off x="5058832" y="5103674"/>
+            <a:ext cx="7052734" cy="1754326"/>
+          </a:xfrm>
+          <a:prstGeom prst="rect">
+            <a:avLst/>
+          </a:prstGeom>
+          <a:noFill/>
+        </p:spPr>
+        <p:txBody>
+          <a:bodyPr wrap="square" rtlCol="0">
+            <a:spAutoFit/>
+          </a:bodyPr>
+          <a:lstStyle/>
+          <a:p>
+            <a:r>
+              <a:rPr lang="en-US" dirty="0"/>
+              <a:t>Figure 6.2: A selection of MASON spatial models (A): Agents (red) exiting a building based on raster data and the resulting trails (yellow). (B) An urban growth model where red areas represent new developments. (C) A Schelling type of model using census areas in Washington DC as its spatial environment. (D) Agents (red circles) moving along on sidewalks (grey lines).</a:t>
+            </a:r>
+          </a:p>
+        </p:txBody>
+      </p:sp>
+    </p:spTree>
+    <p:extLst>
+      <p:ext uri="{BB962C8B-B14F-4D97-AF65-F5344CB8AC3E}">
+        <p14:creationId xmlns:p14="http://schemas.microsoft.com/office/powerpoint/2010/main" val="2308781286"/>
+      </p:ext>
+    </p:extLst>
+  </p:cSld>
+  <p:clrMapOvr>
+    <a:masterClrMapping/>
+  </p:clrMapOvr>
+</p:sld>
+</file>
+
+<file path=ppt/slides/slide7.xml><?xml version="1.0" encoding="utf-8"?>
+<p:sld xmlns:a="http://schemas.openxmlformats.org/drawingml/2006/main" xmlns:r="http://schemas.openxmlformats.org/officeDocument/2006/relationships" xmlns:p="http://schemas.openxmlformats.org/presentationml/2006/main">
+  <p:cSld>
+    <p:spTree>
+      <p:nvGrpSpPr>
+        <p:cNvPr id="1" name=""/>
+        <p:cNvGrpSpPr/>
+        <p:nvPr/>
+      </p:nvGrpSpPr>
+      <p:grpSpPr>
+        <a:xfrm>
+          <a:off x="0" y="0"/>
+          <a:ext cx="0" cy="0"/>
+          <a:chOff x="0" y="0"/>
+          <a:chExt cx="0" cy="0"/>
+        </a:xfrm>
+      </p:grpSpPr>
+      <p:sp>
+        <p:nvSpPr>
+          <p:cNvPr id="2" name="Title 1">
+            <a:extLst>
+              <a:ext uri="{FF2B5EF4-FFF2-40B4-BE49-F238E27FC236}">
+                <a16:creationId xmlns:a16="http://schemas.microsoft.com/office/drawing/2014/main" id="{F74D25CB-B7C6-BD49-A901-DC1BD4635CE0}"/>
+              </a:ext>
+            </a:extLst>
+          </p:cNvPr>
+          <p:cNvSpPr>
+            <a:spLocks noGrp="1"/>
+          </p:cNvSpPr>
+          <p:nvPr>
+            <p:ph type="title"/>
+          </p:nvPr>
+        </p:nvSpPr>
+        <p:spPr/>
+        <p:txBody>
+          <a:bodyPr/>
+          <a:lstStyle/>
+          <a:p>
+            <a:r>
+              <a:rPr lang="en-US" dirty="0"/>
+              <a:t>Repast</a:t>
+            </a:r>
+          </a:p>
+        </p:txBody>
+      </p:sp>
+      <p:pic>
+        <p:nvPicPr>
+          <p:cNvPr id="5" name="Content Placeholder 4">
+            <a:extLst>
+              <a:ext uri="{FF2B5EF4-FFF2-40B4-BE49-F238E27FC236}">
+                <a16:creationId xmlns:a16="http://schemas.microsoft.com/office/drawing/2014/main" id="{9A9D6BD8-190E-5B4F-93CA-7007CB523A69}"/>
+              </a:ext>
+            </a:extLst>
+          </p:cNvPr>
+          <p:cNvPicPr>
+            <a:picLocks noGrp="1" noChangeAspect="1"/>
+          </p:cNvPicPr>
+          <p:nvPr>
+            <p:ph idx="1"/>
+          </p:nvPr>
+        </p:nvPicPr>
+        <p:blipFill>
+          <a:blip r:embed="rId2"/>
+          <a:stretch>
+            <a:fillRect/>
+          </a:stretch>
+        </p:blipFill>
+        <p:spPr>
+          <a:xfrm>
+            <a:off x="1263126" y="1825625"/>
+            <a:ext cx="9665748" cy="4351338"/>
+          </a:xfrm>
+        </p:spPr>
+      </p:pic>
+      <p:sp>
+        <p:nvSpPr>
+          <p:cNvPr id="6" name="TextBox 5">
+            <a:extLst>
+              <a:ext uri="{FF2B5EF4-FFF2-40B4-BE49-F238E27FC236}">
+                <a16:creationId xmlns:a16="http://schemas.microsoft.com/office/drawing/2014/main" id="{68596017-A5DD-A743-B12A-767E0AF5309C}"/>
+              </a:ext>
+            </a:extLst>
+          </p:cNvPr>
+          <p:cNvSpPr txBox="1"/>
+          <p:nvPr/>
+        </p:nvSpPr>
+        <p:spPr>
+          <a:xfrm>
+            <a:off x="4764065" y="5850235"/>
+            <a:ext cx="7427935" cy="923330"/>
+          </a:xfrm>
+          <a:prstGeom prst="rect">
+            <a:avLst/>
+          </a:prstGeom>
+          <a:noFill/>
+        </p:spPr>
+        <p:txBody>
+          <a:bodyPr wrap="square" rtlCol="0">
+            <a:spAutoFit/>
+          </a:bodyPr>
+          <a:lstStyle/>
+          <a:p>
+            <a:r>
+              <a:rPr lang="en-US" dirty="0"/>
+              <a:t>Figure 6.3: Examples of vector agent-based models in </a:t>
+            </a:r>
+            <a:r>
+              <a:rPr lang="en-US" dirty="0" err="1"/>
+              <a:t>Simphony</a:t>
+            </a:r>
+            <a:r>
+              <a:rPr lang="en-US" dirty="0"/>
+              <a:t>. (A) Agents (red stars) moving along on sidewalks (grey Lines). (B) An agent-based model overlaid on NASA world wind (Source: Repast, 2016)</a:t>
+            </a:r>
+          </a:p>
+        </p:txBody>
+      </p:sp>
+    </p:spTree>
+    <p:extLst>
+      <p:ext uri="{BB962C8B-B14F-4D97-AF65-F5344CB8AC3E}">
+        <p14:creationId xmlns:p14="http://schemas.microsoft.com/office/powerpoint/2010/main" val="833412642"/>
+      </p:ext>
+    </p:extLst>
+  </p:cSld>
+  <p:clrMapOvr>
+    <a:masterClrMapping/>
+  </p:clrMapOvr>
+</p:sld>
+</file>
+
+<file path=ppt/slides/slide8.xml><?xml version="1.0" encoding="utf-8"?>
+<p:sld xmlns:a="http://schemas.openxmlformats.org/drawingml/2006/main" xmlns:r="http://schemas.openxmlformats.org/officeDocument/2006/relationships" xmlns:p="http://schemas.openxmlformats.org/presentationml/2006/main">
+  <p:cSld>
+    <p:spTree>
+      <p:nvGrpSpPr>
+        <p:cNvPr id="1" name=""/>
+        <p:cNvGrpSpPr/>
+        <p:nvPr/>
+      </p:nvGrpSpPr>
+      <p:grpSpPr>
+        <a:xfrm>
+          <a:off x="0" y="0"/>
+          <a:ext cx="0" cy="0"/>
+          <a:chOff x="0" y="0"/>
+          <a:chExt cx="0" cy="0"/>
+        </a:xfrm>
+      </p:grpSpPr>
+      <p:sp>
+        <p:nvSpPr>
+          <p:cNvPr id="2" name="Title 1">
+            <a:extLst>
+              <a:ext uri="{FF2B5EF4-FFF2-40B4-BE49-F238E27FC236}">
+                <a16:creationId xmlns:a16="http://schemas.microsoft.com/office/drawing/2014/main" id="{BE7DD025-1C90-D346-A0EB-C1F265F6B75E}"/>
+              </a:ext>
+            </a:extLst>
+          </p:cNvPr>
+          <p:cNvSpPr>
+            <a:spLocks noGrp="1"/>
+          </p:cNvSpPr>
+          <p:nvPr>
+            <p:ph type="title"/>
+          </p:nvPr>
+        </p:nvSpPr>
+        <p:spPr/>
+        <p:txBody>
+          <a:bodyPr/>
+          <a:lstStyle/>
+          <a:p>
+            <a:r>
+              <a:rPr lang="en-US" dirty="0"/>
+              <a:t>NetLogo</a:t>
+            </a:r>
+          </a:p>
+        </p:txBody>
+      </p:sp>
+      <p:pic>
+        <p:nvPicPr>
+          <p:cNvPr id="6" name="Content Placeholder 5">
+            <a:extLst>
+              <a:ext uri="{FF2B5EF4-FFF2-40B4-BE49-F238E27FC236}">
+                <a16:creationId xmlns:a16="http://schemas.microsoft.com/office/drawing/2014/main" id="{E549785F-E522-6C45-844D-21827DACCA63}"/>
+              </a:ext>
+            </a:extLst>
+          </p:cNvPr>
+          <p:cNvPicPr>
+            <a:picLocks noGrp="1" noChangeAspect="1"/>
+          </p:cNvPicPr>
+          <p:nvPr>
+            <p:ph idx="1"/>
+          </p:nvPr>
+        </p:nvPicPr>
+        <p:blipFill>
+          <a:blip r:embed="rId2"/>
+          <a:stretch>
+            <a:fillRect/>
+          </a:stretch>
+        </p:blipFill>
+        <p:spPr>
+          <a:xfrm>
+            <a:off x="4382089" y="1825625"/>
+            <a:ext cx="3427822" cy="4351338"/>
+          </a:xfrm>
+        </p:spPr>
+      </p:pic>
+      <p:sp>
+        <p:nvSpPr>
+          <p:cNvPr id="4" name="TextBox 3">
+            <a:extLst>
+              <a:ext uri="{FF2B5EF4-FFF2-40B4-BE49-F238E27FC236}">
+                <a16:creationId xmlns:a16="http://schemas.microsoft.com/office/drawing/2014/main" id="{7E9332EF-BFEF-EF42-B1B2-4B09D53ADF61}"/>
+              </a:ext>
+            </a:extLst>
+          </p:cNvPr>
+          <p:cNvSpPr txBox="1"/>
+          <p:nvPr/>
+        </p:nvSpPr>
+        <p:spPr>
+          <a:xfrm>
+            <a:off x="413359" y="6325644"/>
+            <a:ext cx="11624153" cy="1200329"/>
+          </a:xfrm>
+          <a:prstGeom prst="rect">
+            <a:avLst/>
+          </a:prstGeom>
+          <a:noFill/>
+        </p:spPr>
+        <p:txBody>
+          <a:bodyPr wrap="square" rtlCol="0">
+            <a:spAutoFit/>
+          </a:bodyPr>
+          <a:lstStyle/>
+          <a:p>
+            <a:r>
+              <a:rPr lang="en-US" dirty="0"/>
+              <a:t>Figure 6.4: A selection of geographically explicit agent-based models </a:t>
+            </a:r>
+            <a:r>
+              <a:rPr lang="en-US" dirty="0" err="1"/>
+              <a:t>utilising</a:t>
+            </a:r>
+            <a:r>
+              <a:rPr lang="en-US" dirty="0"/>
+              <a:t> NetLogo. (A) Rainfall where rain (blue) falls and flows to a lower elevation based on a digital elevation model captured in 2 and 3D. (B) Agents (white) moving along on sidewalks (orange). (C) Schelling type model using census areas in Washington DC as their spatial environment. (D) Commuting along a road network.</a:t>
+            </a:r>
+          </a:p>
+        </p:txBody>
+      </p:sp>
+    </p:spTree>
+    <p:extLst>
+      <p:ext uri="{BB962C8B-B14F-4D97-AF65-F5344CB8AC3E}">
+        <p14:creationId xmlns:p14="http://schemas.microsoft.com/office/powerpoint/2010/main" val="3601463634"/>
+      </p:ext>
+    </p:extLst>
+  </p:cSld>
+  <p:clrMapOvr>
+    <a:masterClrMapping/>
+  </p:clrMapOvr>
+</p:sld>
+</file>
+
+<file path=ppt/slides/slide9.xml><?xml version="1.0" encoding="utf-8"?>
+<p:sld xmlns:a="http://schemas.openxmlformats.org/drawingml/2006/main" xmlns:r="http://schemas.openxmlformats.org/officeDocument/2006/relationships" xmlns:p="http://schemas.openxmlformats.org/presentationml/2006/main">
+  <p:cSld>
+    <p:spTree>
+      <p:nvGrpSpPr>
+        <p:cNvPr id="1" name=""/>
+        <p:cNvGrpSpPr/>
+        <p:nvPr/>
+      </p:nvGrpSpPr>
+      <p:grpSpPr>
+        <a:xfrm>
+          <a:off x="0" y="0"/>
+          <a:ext cx="0" cy="0"/>
+          <a:chOff x="0" y="0"/>
+          <a:chExt cx="0" cy="0"/>
+        </a:xfrm>
+      </p:grpSpPr>
+      <p:sp>
+        <p:nvSpPr>
+          <p:cNvPr id="2" name="Title 1">
+            <a:extLst>
+              <a:ext uri="{FF2B5EF4-FFF2-40B4-BE49-F238E27FC236}">
+                <a16:creationId xmlns:a16="http://schemas.microsoft.com/office/drawing/2014/main" id="{8AA4795B-8425-0C4A-96E3-CD02977A3F7A}"/>
+              </a:ext>
+            </a:extLst>
+          </p:cNvPr>
+          <p:cNvSpPr>
+            <a:spLocks noGrp="1"/>
+          </p:cNvSpPr>
+          <p:nvPr>
+            <p:ph type="title"/>
+          </p:nvPr>
+        </p:nvSpPr>
+        <p:spPr/>
+        <p:txBody>
+          <a:bodyPr/>
+          <a:lstStyle/>
+          <a:p>
+            <a:r>
+              <a:rPr lang="en-US" dirty="0"/>
+              <a:t>GAMA</a:t>
+            </a:r>
+          </a:p>
+        </p:txBody>
+      </p:sp>
+      <p:pic>
+        <p:nvPicPr>
+          <p:cNvPr id="6" name="Content Placeholder 5">
+            <a:extLst>
+              <a:ext uri="{FF2B5EF4-FFF2-40B4-BE49-F238E27FC236}">
+                <a16:creationId xmlns:a16="http://schemas.microsoft.com/office/drawing/2014/main" id="{D9C2880F-F9F4-E646-824B-2775ECDECF22}"/>
+              </a:ext>
+            </a:extLst>
+          </p:cNvPr>
+          <p:cNvPicPr>
+            <a:picLocks noGrp="1" noChangeAspect="1"/>
+          </p:cNvPicPr>
+          <p:nvPr>
+            <p:ph idx="1"/>
+          </p:nvPr>
+        </p:nvPicPr>
+        <p:blipFill>
+          <a:blip r:embed="rId2"/>
+          <a:stretch>
+            <a:fillRect/>
+          </a:stretch>
+        </p:blipFill>
+        <p:spPr>
+          <a:xfrm>
+            <a:off x="2992882" y="1825625"/>
+            <a:ext cx="6206235" cy="4351338"/>
+          </a:xfrm>
+        </p:spPr>
+      </p:pic>
+      <p:sp>
+        <p:nvSpPr>
+          <p:cNvPr id="4" name="TextBox 3">
+            <a:extLst>
+              <a:ext uri="{FF2B5EF4-FFF2-40B4-BE49-F238E27FC236}">
+                <a16:creationId xmlns:a16="http://schemas.microsoft.com/office/drawing/2014/main" id="{775EC279-CD4E-7D45-AF83-5A00BAF39D2A}"/>
+              </a:ext>
+            </a:extLst>
+          </p:cNvPr>
+          <p:cNvSpPr txBox="1"/>
+          <p:nvPr/>
+        </p:nvSpPr>
+        <p:spPr>
+          <a:xfrm>
+            <a:off x="1608667" y="6383866"/>
+            <a:ext cx="8652933" cy="646331"/>
+          </a:xfrm>
+          <a:prstGeom prst="rect">
+            <a:avLst/>
+          </a:prstGeom>
+          <a:noFill/>
+        </p:spPr>
+        <p:txBody>
+          <a:bodyPr wrap="square" rtlCol="0">
+            <a:spAutoFit/>
+          </a:bodyPr>
+          <a:lstStyle/>
+          <a:p>
+            <a:r>
+              <a:rPr lang="en-US" dirty="0"/>
+              <a:t>Figure 6.5: GAMA platform: Advanced </a:t>
+            </a:r>
+            <a:r>
+              <a:rPr lang="en-US" dirty="0" err="1"/>
+              <a:t>visualisation</a:t>
+            </a:r>
+            <a:r>
+              <a:rPr lang="en-US" dirty="0"/>
+              <a:t> of simulations (A and B). (C) Built in charting and functions. (D) User interface (Source: GAMA, 2016).</a:t>
+            </a:r>
+          </a:p>
+        </p:txBody>
+      </p:sp>
+    </p:spTree>
+    <p:extLst>
+      <p:ext uri="{BB962C8B-B14F-4D97-AF65-F5344CB8AC3E}">
+        <p14:creationId xmlns:p14="http://schemas.microsoft.com/office/powerpoint/2010/main" val="758770558"/>
       </p:ext>
     </p:extLst>
   </p:cSld>
@@ -3677,4 +5380,299 @@
     </a:ext>
   </a:extLst>
 </a:theme>
+</file>
+
+<file path=ppt/theme/theme2.xml><?xml version="1.0" encoding="utf-8"?>
+<a:theme xmlns:a="http://schemas.openxmlformats.org/drawingml/2006/main" name="Office Theme">
+  <a:themeElements>
+    <a:clrScheme name="Office">
+      <a:dk1>
+        <a:sysClr val="windowText" lastClr="000000"/>
+      </a:dk1>
+      <a:lt1>
+        <a:sysClr val="window" lastClr="FFFFFF"/>
+      </a:lt1>
+      <a:dk2>
+        <a:srgbClr val="44546A"/>
+      </a:dk2>
+      <a:lt2>
+        <a:srgbClr val="E7E6E6"/>
+      </a:lt2>
+      <a:accent1>
+        <a:srgbClr val="4472C4"/>
+      </a:accent1>
+      <a:accent2>
+        <a:srgbClr val="ED7D31"/>
+      </a:accent2>
+      <a:accent3>
+        <a:srgbClr val="A5A5A5"/>
+      </a:accent3>
+      <a:accent4>
+        <a:srgbClr val="FFC000"/>
+      </a:accent4>
+      <a:accent5>
+        <a:srgbClr val="5B9BD5"/>
+      </a:accent5>
+      <a:accent6>
+        <a:srgbClr val="70AD47"/>
+      </a:accent6>
+      <a:hlink>
+        <a:srgbClr val="0563C1"/>
+      </a:hlink>
+      <a:folHlink>
+        <a:srgbClr val="954F72"/>
+      </a:folHlink>
+    </a:clrScheme>
+    <a:fontScheme name="Office">
+      <a:majorFont>
+        <a:latin typeface="Calibri Light" panose="020F0302020204030204"/>
+        <a:ea typeface=""/>
+        <a:cs typeface=""/>
+        <a:font script="Jpan" typeface="游ゴシック Light"/>
+        <a:font script="Hang" typeface="맑은 고딕"/>
+        <a:font script="Hans" typeface="等线 Light"/>
+        <a:font script="Hant" typeface="新細明體"/>
+        <a:font script="Arab" typeface="Times New Roman"/>
+        <a:font script="Hebr" typeface="Times New Roman"/>
+        <a:font script="Thai" typeface="Angsana New"/>
+        <a:font script="Ethi" typeface="Nyala"/>
+        <a:font script="Beng" typeface="Vrinda"/>
+        <a:font script="Gujr" typeface="Shruti"/>
+        <a:font script="Khmr" typeface="MoolBoran"/>
+        <a:font script="Knda" typeface="Tunga"/>
+        <a:font script="Guru" typeface="Raavi"/>
+        <a:font script="Cans" typeface="Euphemia"/>
+        <a:font script="Cher" typeface="Plantagenet Cherokee"/>
+        <a:font script="Yiii" typeface="Microsoft Yi Baiti"/>
+        <a:font script="Tibt" typeface="Microsoft Himalaya"/>
+        <a:font script="Thaa" typeface="MV Boli"/>
+        <a:font script="Deva" typeface="Mangal"/>
+        <a:font script="Telu" typeface="Gautami"/>
+        <a:font script="Taml" typeface="Latha"/>
+        <a:font script="Syrc" typeface="Estrangelo Edessa"/>
+        <a:font script="Orya" typeface="Kalinga"/>
+        <a:font script="Mlym" typeface="Kartika"/>
+        <a:font script="Laoo" typeface="DokChampa"/>
+        <a:font script="Sinh" typeface="Iskoola Pota"/>
+        <a:font script="Mong" typeface="Mongolian Baiti"/>
+        <a:font script="Viet" typeface="Times New Roman"/>
+        <a:font script="Uigh" typeface="Microsoft Uighur"/>
+        <a:font script="Geor" typeface="Sylfaen"/>
+        <a:font script="Armn" typeface="Arial"/>
+        <a:font script="Bugi" typeface="Leelawadee UI"/>
+        <a:font script="Bopo" typeface="Microsoft JhengHei"/>
+        <a:font script="Java" typeface="Javanese Text"/>
+        <a:font script="Lisu" typeface="Segoe UI"/>
+        <a:font script="Mymr" typeface="Myanmar Text"/>
+        <a:font script="Nkoo" typeface="Ebrima"/>
+        <a:font script="Olck" typeface="Nirmala UI"/>
+        <a:font script="Osma" typeface="Ebrima"/>
+        <a:font script="Phag" typeface="Phagspa"/>
+        <a:font script="Syrn" typeface="Estrangelo Edessa"/>
+        <a:font script="Syrj" typeface="Estrangelo Edessa"/>
+        <a:font script="Syre" typeface="Estrangelo Edessa"/>
+        <a:font script="Sora" typeface="Nirmala UI"/>
+        <a:font script="Tale" typeface="Microsoft Tai Le"/>
+        <a:font script="Talu" typeface="Microsoft New Tai Lue"/>
+        <a:font script="Tfng" typeface="Ebrima"/>
+      </a:majorFont>
+      <a:minorFont>
+        <a:latin typeface="Calibri" panose="020F0502020204030204"/>
+        <a:ea typeface=""/>
+        <a:cs typeface=""/>
+        <a:font script="Jpan" typeface="游ゴシック"/>
+        <a:font script="Hang" typeface="맑은 고딕"/>
+        <a:font script="Hans" typeface="等线"/>
+        <a:font script="Hant" typeface="新細明體"/>
+        <a:font script="Arab" typeface="Arial"/>
+        <a:font script="Hebr" typeface="Arial"/>
+        <a:font script="Thai" typeface="Cordia New"/>
+        <a:font script="Ethi" typeface="Nyala"/>
+        <a:font script="Beng" typeface="Vrinda"/>
+        <a:font script="Gujr" typeface="Shruti"/>
+        <a:font script="Khmr" typeface="DaunPenh"/>
+        <a:font script="Knda" typeface="Tunga"/>
+        <a:font script="Guru" typeface="Raavi"/>
+        <a:font script="Cans" typeface="Euphemia"/>
+        <a:font script="Cher" typeface="Plantagenet Cherokee"/>
+        <a:font script="Yiii" typeface="Microsoft Yi Baiti"/>
+        <a:font script="Tibt" typeface="Microsoft Himalaya"/>
+        <a:font script="Thaa" typeface="MV Boli"/>
+        <a:font script="Deva" typeface="Mangal"/>
+        <a:font script="Telu" typeface="Gautami"/>
+        <a:font script="Taml" typeface="Latha"/>
+        <a:font script="Syrc" typeface="Estrangelo Edessa"/>
+        <a:font script="Orya" typeface="Kalinga"/>
+        <a:font script="Mlym" typeface="Kartika"/>
+        <a:font script="Laoo" typeface="DokChampa"/>
+        <a:font script="Sinh" typeface="Iskoola Pota"/>
+        <a:font script="Mong" typeface="Mongolian Baiti"/>
+        <a:font script="Viet" typeface="Arial"/>
+        <a:font script="Uigh" typeface="Microsoft Uighur"/>
+        <a:font script="Geor" typeface="Sylfaen"/>
+        <a:font script="Armn" typeface="Arial"/>
+        <a:font script="Bugi" typeface="Leelawadee UI"/>
+        <a:font script="Bopo" typeface="Microsoft JhengHei"/>
+        <a:font script="Java" typeface="Javanese Text"/>
+        <a:font script="Lisu" typeface="Segoe UI"/>
+        <a:font script="Mymr" typeface="Myanmar Text"/>
+        <a:font script="Nkoo" typeface="Ebrima"/>
+        <a:font script="Olck" typeface="Nirmala UI"/>
+        <a:font script="Osma" typeface="Ebrima"/>
+        <a:font script="Phag" typeface="Phagspa"/>
+        <a:font script="Syrn" typeface="Estrangelo Edessa"/>
+        <a:font script="Syrj" typeface="Estrangelo Edessa"/>
+        <a:font script="Syre" typeface="Estrangelo Edessa"/>
+        <a:font script="Sora" typeface="Nirmala UI"/>
+        <a:font script="Tale" typeface="Microsoft Tai Le"/>
+        <a:font script="Talu" typeface="Microsoft New Tai Lue"/>
+        <a:font script="Tfng" typeface="Ebrima"/>
+      </a:minorFont>
+    </a:fontScheme>
+    <a:fmtScheme name="Office">
+      <a:fillStyleLst>
+        <a:solidFill>
+          <a:schemeClr val="phClr"/>
+        </a:solidFill>
+        <a:gradFill rotWithShape="1">
+          <a:gsLst>
+            <a:gs pos="0">
+              <a:schemeClr val="phClr">
+                <a:lumMod val="110000"/>
+                <a:satMod val="105000"/>
+                <a:tint val="67000"/>
+              </a:schemeClr>
+            </a:gs>
+            <a:gs pos="50000">
+              <a:schemeClr val="phClr">
+                <a:lumMod val="105000"/>
+                <a:satMod val="103000"/>
+                <a:tint val="73000"/>
+              </a:schemeClr>
+            </a:gs>
+            <a:gs pos="100000">
+              <a:schemeClr val="phClr">
+                <a:lumMod val="105000"/>
+                <a:satMod val="109000"/>
+                <a:tint val="81000"/>
+              </a:schemeClr>
+            </a:gs>
+          </a:gsLst>
+          <a:lin ang="5400000" scaled="0"/>
+        </a:gradFill>
+        <a:gradFill rotWithShape="1">
+          <a:gsLst>
+            <a:gs pos="0">
+              <a:schemeClr val="phClr">
+                <a:satMod val="103000"/>
+                <a:lumMod val="102000"/>
+                <a:tint val="94000"/>
+              </a:schemeClr>
+            </a:gs>
+            <a:gs pos="50000">
+              <a:schemeClr val="phClr">
+                <a:satMod val="110000"/>
+                <a:lumMod val="100000"/>
+                <a:shade val="100000"/>
+              </a:schemeClr>
+            </a:gs>
+            <a:gs pos="100000">
+              <a:schemeClr val="phClr">
+                <a:lumMod val="99000"/>
+                <a:satMod val="120000"/>
+                <a:shade val="78000"/>
+              </a:schemeClr>
+            </a:gs>
+          </a:gsLst>
+          <a:lin ang="5400000" scaled="0"/>
+        </a:gradFill>
+      </a:fillStyleLst>
+      <a:lnStyleLst>
+        <a:ln w="6350" cap="flat" cmpd="sng" algn="ctr">
+          <a:solidFill>
+            <a:schemeClr val="phClr"/>
+          </a:solidFill>
+          <a:prstDash val="solid"/>
+          <a:miter lim="800000"/>
+        </a:ln>
+        <a:ln w="12700" cap="flat" cmpd="sng" algn="ctr">
+          <a:solidFill>
+            <a:schemeClr val="phClr"/>
+          </a:solidFill>
+          <a:prstDash val="solid"/>
+          <a:miter lim="800000"/>
+        </a:ln>
+        <a:ln w="19050" cap="flat" cmpd="sng" algn="ctr">
+          <a:solidFill>
+            <a:schemeClr val="phClr"/>
+          </a:solidFill>
+          <a:prstDash val="solid"/>
+          <a:miter lim="800000"/>
+        </a:ln>
+      </a:lnStyleLst>
+      <a:effectStyleLst>
+        <a:effectStyle>
+          <a:effectLst/>
+        </a:effectStyle>
+        <a:effectStyle>
+          <a:effectLst/>
+        </a:effectStyle>
+        <a:effectStyle>
+          <a:effectLst>
+            <a:outerShdw blurRad="57150" dist="19050" dir="5400000" algn="ctr" rotWithShape="0">
+              <a:srgbClr val="000000">
+                <a:alpha val="63000"/>
+              </a:srgbClr>
+            </a:outerShdw>
+          </a:effectLst>
+        </a:effectStyle>
+      </a:effectStyleLst>
+      <a:bgFillStyleLst>
+        <a:solidFill>
+          <a:schemeClr val="phClr"/>
+        </a:solidFill>
+        <a:solidFill>
+          <a:schemeClr val="phClr">
+            <a:tint val="95000"/>
+            <a:satMod val="170000"/>
+          </a:schemeClr>
+        </a:solidFill>
+        <a:gradFill rotWithShape="1">
+          <a:gsLst>
+            <a:gs pos="0">
+              <a:schemeClr val="phClr">
+                <a:tint val="93000"/>
+                <a:satMod val="150000"/>
+                <a:shade val="98000"/>
+                <a:lumMod val="102000"/>
+              </a:schemeClr>
+            </a:gs>
+            <a:gs pos="50000">
+              <a:schemeClr val="phClr">
+                <a:tint val="98000"/>
+                <a:satMod val="130000"/>
+                <a:shade val="90000"/>
+                <a:lumMod val="103000"/>
+              </a:schemeClr>
+            </a:gs>
+            <a:gs pos="100000">
+              <a:schemeClr val="phClr">
+                <a:shade val="63000"/>
+                <a:satMod val="120000"/>
+              </a:schemeClr>
+            </a:gs>
+          </a:gsLst>
+          <a:lin ang="5400000" scaled="0"/>
+        </a:gradFill>
+      </a:bgFillStyleLst>
+    </a:fmtScheme>
+  </a:themeElements>
+  <a:objectDefaults/>
+  <a:extraClrSchemeLst/>
+  <a:extLst>
+    <a:ext uri="{05A4C25C-085E-4340-85A3-A5531E510DB2}">
+      <thm15:themeFamily xmlns:thm15="http://schemas.microsoft.com/office/thememl/2012/main" name="Office Theme" id="{62F939B6-93AF-4DB8-9C6B-D6C7DFDC589F}" vid="{4A3C46E8-61CC-4603-A589-7422A47A8E4A}"/>
+    </a:ext>
+  </a:extLst>
+</a:theme>
 </file>
</xml_diff>